<commit_message>
add pptx with edits.
</commit_message>
<xml_diff>
--- a/2025-9-22 locke m2int lab LLM LRs.pptx
+++ b/2025-9-22 locke m2int lab LLM LRs.pptx
@@ -5,28 +5,26 @@
     <p:sldMasterId id="2147483648" r:id="rId1"/>
   </p:sldMasterIdLst>
   <p:notesMasterIdLst>
-    <p:notesMasterId r:id="rId21"/>
+    <p:notesMasterId r:id="rId19"/>
   </p:notesMasterIdLst>
   <p:sldIdLst>
     <p:sldId id="256" r:id="rId2"/>
     <p:sldId id="257" r:id="rId3"/>
     <p:sldId id="263" r:id="rId4"/>
     <p:sldId id="262" r:id="rId5"/>
-    <p:sldId id="272" r:id="rId6"/>
-    <p:sldId id="264" r:id="rId7"/>
-    <p:sldId id="265" r:id="rId8"/>
-    <p:sldId id="258" r:id="rId9"/>
-    <p:sldId id="268" r:id="rId10"/>
-    <p:sldId id="269" r:id="rId11"/>
-    <p:sldId id="270" r:id="rId12"/>
-    <p:sldId id="259" r:id="rId13"/>
-    <p:sldId id="271" r:id="rId14"/>
-    <p:sldId id="260" r:id="rId15"/>
-    <p:sldId id="261" r:id="rId16"/>
-    <p:sldId id="266" r:id="rId17"/>
-    <p:sldId id="273" r:id="rId18"/>
-    <p:sldId id="275" r:id="rId19"/>
-    <p:sldId id="274" r:id="rId20"/>
+    <p:sldId id="264" r:id="rId6"/>
+    <p:sldId id="272" r:id="rId7"/>
+    <p:sldId id="258" r:id="rId8"/>
+    <p:sldId id="268" r:id="rId9"/>
+    <p:sldId id="269" r:id="rId10"/>
+    <p:sldId id="259" r:id="rId11"/>
+    <p:sldId id="271" r:id="rId12"/>
+    <p:sldId id="260" r:id="rId13"/>
+    <p:sldId id="261" r:id="rId14"/>
+    <p:sldId id="266" r:id="rId15"/>
+    <p:sldId id="275" r:id="rId16"/>
+    <p:sldId id="276" r:id="rId17"/>
+    <p:sldId id="274" r:id="rId18"/>
   </p:sldIdLst>
   <p:sldSz cx="12192000" cy="6858000"/>
   <p:notesSz cx="6858000" cy="9144000"/>
@@ -125,6 +123,11 @@
       </a:defRPr>
     </a:lvl9pPr>
   </p:defaultTextStyle>
+  <p:extLst>
+    <p:ext uri="{EFAFB233-063F-42B5-8137-9DF3F51BA10A}">
+      <p15:sldGuideLst xmlns:p15="http://schemas.microsoft.com/office/powerpoint/2012/main"/>
+    </p:ext>
+  </p:extLst>
 </p:presentation>
 </file>
 
@@ -605,10 +608,7 @@
           <a:bodyPr/>
           <a:lstStyle/>
           <a:p>
-            <a:r>
-              <a:rPr lang="en-US" dirty="0"/>
-              <a:t>[ ] link to explainer notebook.</a:t>
-            </a:r>
+            <a:endParaRPr lang="en-US" dirty="0"/>
           </a:p>
         </p:txBody>
       </p:sp>
@@ -787,7 +787,7 @@
           <a:p>
             <a:fld id="{B1085349-0584-B547-A22B-EBC457042337}" type="slidenum">
               <a:rPr lang="en-US" smtClean="0"/>
-              <a:t>8</a:t>
+              <a:t>7</a:t>
             </a:fld>
             <a:endParaRPr lang="en-US"/>
           </a:p>
@@ -852,16 +852,12 @@
           <a:p>
             <a:r>
               <a:rPr lang="en-US" dirty="0"/>
-              <a:t>•	All models: negligible mean bias (≈1.00×).</a:t>
-            </a:r>
-          </a:p>
-          <a:p>
-            <a:r>
-              <a:rPr lang="en-US" dirty="0"/>
-              <a:t>	•	95% limits of agreement: GPT‑5 ≈ 0.26×–3.70×; o3 ≈ 0.23×–4.28×; GPT‑4o ≈ 0.23×–4.53×.</a:t>
-            </a:r>
-          </a:p>
-          <a:p>
+              <a:t>Newer model tighter dispersion; qualitative category agreement substantial (GPT‑5 </a:t>
+            </a:r>
+            <a:r>
+              <a:rPr lang="el-GR" dirty="0"/>
+              <a:t>κ≈0.78). </a:t>
+            </a:r>
             <a:endParaRPr lang="en-US" dirty="0"/>
           </a:p>
         </p:txBody>
@@ -884,98 +880,6 @@
             <a:fld id="{B1085349-0584-B547-A22B-EBC457042337}" type="slidenum">
               <a:rPr lang="en-US" smtClean="0"/>
               <a:t>11</a:t>
-            </a:fld>
-            <a:endParaRPr lang="en-US"/>
-          </a:p>
-        </p:txBody>
-      </p:sp>
-    </p:spTree>
-    <p:extLst>
-      <p:ext uri="{BB962C8B-B14F-4D97-AF65-F5344CB8AC3E}">
-        <p14:creationId xmlns:p14="http://schemas.microsoft.com/office/powerpoint/2010/main" val="3345385171"/>
-      </p:ext>
-    </p:extLst>
-  </p:cSld>
-  <p:clrMapOvr>
-    <a:masterClrMapping/>
-  </p:clrMapOvr>
-</p:notes>
-</file>
-
-<file path=ppt/notesSlides/notesSlide5.xml><?xml version="1.0" encoding="utf-8"?>
-<p:notes xmlns:a="http://schemas.openxmlformats.org/drawingml/2006/main" xmlns:r="http://schemas.openxmlformats.org/officeDocument/2006/relationships" xmlns:p="http://schemas.openxmlformats.org/presentationml/2006/main">
-  <p:cSld>
-    <p:spTree>
-      <p:nvGrpSpPr>
-        <p:cNvPr id="1" name=""/>
-        <p:cNvGrpSpPr/>
-        <p:nvPr/>
-      </p:nvGrpSpPr>
-      <p:grpSpPr>
-        <a:xfrm>
-          <a:off x="0" y="0"/>
-          <a:ext cx="0" cy="0"/>
-          <a:chOff x="0" y="0"/>
-          <a:chExt cx="0" cy="0"/>
-        </a:xfrm>
-      </p:grpSpPr>
-      <p:sp>
-        <p:nvSpPr>
-          <p:cNvPr id="2" name="Slide Image Placeholder 1"/>
-          <p:cNvSpPr>
-            <a:spLocks noGrp="1" noRot="1" noChangeAspect="1"/>
-          </p:cNvSpPr>
-          <p:nvPr>
-            <p:ph type="sldImg"/>
-          </p:nvPr>
-        </p:nvSpPr>
-        <p:spPr/>
-      </p:sp>
-      <p:sp>
-        <p:nvSpPr>
-          <p:cNvPr id="3" name="Notes Placeholder 2"/>
-          <p:cNvSpPr>
-            <a:spLocks noGrp="1"/>
-          </p:cNvSpPr>
-          <p:nvPr>
-            <p:ph type="body" idx="1"/>
-          </p:nvPr>
-        </p:nvSpPr>
-        <p:spPr/>
-        <p:txBody>
-          <a:bodyPr/>
-          <a:lstStyle/>
-          <a:p>
-            <a:r>
-              <a:rPr lang="en-US" dirty="0"/>
-              <a:t>Newer model tighter dispersion; qualitative category agreement substantial (GPT‑5 </a:t>
-            </a:r>
-            <a:r>
-              <a:rPr lang="el-GR" dirty="0"/>
-              <a:t>κ≈0.78). </a:t>
-            </a:r>
-            <a:endParaRPr lang="en-US" dirty="0"/>
-          </a:p>
-        </p:txBody>
-      </p:sp>
-      <p:sp>
-        <p:nvSpPr>
-          <p:cNvPr id="4" name="Slide Number Placeholder 3"/>
-          <p:cNvSpPr>
-            <a:spLocks noGrp="1"/>
-          </p:cNvSpPr>
-          <p:nvPr>
-            <p:ph type="sldNum" sz="quarter" idx="5"/>
-          </p:nvPr>
-        </p:nvSpPr>
-        <p:spPr/>
-        <p:txBody>
-          <a:bodyPr/>
-          <a:lstStyle/>
-          <a:p>
-            <a:fld id="{B1085349-0584-B547-A22B-EBC457042337}" type="slidenum">
-              <a:rPr lang="en-US" smtClean="0"/>
-              <a:t>13</a:t>
             </a:fld>
             <a:endParaRPr lang="en-US"/>
           </a:p>
@@ -4284,12 +4188,6 @@
               <a:t>Presented by: Brian Locke MD MSCI</a:t>
             </a:r>
           </a:p>
-          <a:p>
-            <a:endParaRPr lang="en-US" dirty="0"/>
-          </a:p>
-          <a:p>
-            <a:endParaRPr lang="en-US" dirty="0"/>
-          </a:p>
         </p:txBody>
       </p:sp>
     </p:spTree>
@@ -4306,208 +4204,6 @@
 </file>
 
 <file path=ppt/slides/slide10.xml><?xml version="1.0" encoding="utf-8"?>
-<p:sld xmlns:a="http://schemas.openxmlformats.org/drawingml/2006/main" xmlns:r="http://schemas.openxmlformats.org/officeDocument/2006/relationships" xmlns:p="http://schemas.openxmlformats.org/presentationml/2006/main">
-  <p:cSld>
-    <p:spTree>
-      <p:nvGrpSpPr>
-        <p:cNvPr id="1" name=""/>
-        <p:cNvGrpSpPr/>
-        <p:nvPr/>
-      </p:nvGrpSpPr>
-      <p:grpSpPr>
-        <a:xfrm>
-          <a:off x="0" y="0"/>
-          <a:ext cx="0" cy="0"/>
-          <a:chOff x="0" y="0"/>
-          <a:chExt cx="0" cy="0"/>
-        </a:xfrm>
-      </p:grpSpPr>
-      <p:sp>
-        <p:nvSpPr>
-          <p:cNvPr id="2" name="Title 1">
-            <a:extLst>
-              <a:ext uri="{FF2B5EF4-FFF2-40B4-BE49-F238E27FC236}">
-                <a16:creationId xmlns:a16="http://schemas.microsoft.com/office/drawing/2014/main" id="{43C13E1F-2C63-A4A5-5F5F-F8CEA293ABCE}"/>
-              </a:ext>
-            </a:extLst>
-          </p:cNvPr>
-          <p:cNvSpPr>
-            <a:spLocks noGrp="1"/>
-          </p:cNvSpPr>
-          <p:nvPr>
-            <p:ph type="title"/>
-          </p:nvPr>
-        </p:nvSpPr>
-        <p:spPr/>
-        <p:txBody>
-          <a:bodyPr/>
-          <a:lstStyle/>
-          <a:p>
-            <a:r>
-              <a:rPr lang="en-US" dirty="0"/>
-              <a:t>Prompt Strategy: </a:t>
-            </a:r>
-          </a:p>
-        </p:txBody>
-      </p:sp>
-      <p:sp>
-        <p:nvSpPr>
-          <p:cNvPr id="3" name="Content Placeholder 2">
-            <a:extLst>
-              <a:ext uri="{FF2B5EF4-FFF2-40B4-BE49-F238E27FC236}">
-                <a16:creationId xmlns:a16="http://schemas.microsoft.com/office/drawing/2014/main" id="{993C719E-48C9-7C90-B014-8E87BF48B396}"/>
-              </a:ext>
-            </a:extLst>
-          </p:cNvPr>
-          <p:cNvSpPr>
-            <a:spLocks noGrp="1"/>
-          </p:cNvSpPr>
-          <p:nvPr>
-            <p:ph idx="1"/>
-          </p:nvPr>
-        </p:nvSpPr>
-        <p:spPr/>
-        <p:txBody>
-          <a:bodyPr/>
-          <a:lstStyle/>
-          <a:p>
-            <a:r>
-              <a:rPr lang="en-US" dirty="0"/>
-              <a:t>System role: “Bayesian diagnostic assistant”; return only JSON {"value": float&gt;0}.</a:t>
-            </a:r>
-          </a:p>
-          <a:p>
-            <a:r>
-              <a:rPr lang="en-US" dirty="0"/>
-              <a:t>	•	Definition shown: LR = P(finding | diagnosis) / P(finding | not‑diagnosis).</a:t>
-            </a:r>
-          </a:p>
-          <a:p>
-            <a:r>
-              <a:rPr lang="en-US" dirty="0"/>
-              <a:t>	•	Few‑shot: 8 examples for non‑reasoning model; 2 for reasoning models; examples are clinician‑estimated, not scraped.</a:t>
-            </a:r>
-          </a:p>
-          <a:p>
-            <a:r>
-              <a:rPr lang="en-US" dirty="0"/>
-              <a:t>	•	Inference: GPT‑4o temperature 0.2; o3/GPT‑5 reasoning effort “medium”; verbosity minimized; structured outputs enforced with schema. </a:t>
-            </a:r>
-          </a:p>
-        </p:txBody>
-      </p:sp>
-    </p:spTree>
-    <p:extLst>
-      <p:ext uri="{BB962C8B-B14F-4D97-AF65-F5344CB8AC3E}">
-        <p14:creationId xmlns:p14="http://schemas.microsoft.com/office/powerpoint/2010/main" val="443676690"/>
-      </p:ext>
-    </p:extLst>
-  </p:cSld>
-  <p:clrMapOvr>
-    <a:masterClrMapping/>
-  </p:clrMapOvr>
-</p:sld>
-</file>
-
-<file path=ppt/slides/slide11.xml><?xml version="1.0" encoding="utf-8"?>
-<p:sld xmlns:a="http://schemas.openxmlformats.org/drawingml/2006/main" xmlns:r="http://schemas.openxmlformats.org/officeDocument/2006/relationships" xmlns:p="http://schemas.openxmlformats.org/presentationml/2006/main">
-  <p:cSld>
-    <p:spTree>
-      <p:nvGrpSpPr>
-        <p:cNvPr id="1" name=""/>
-        <p:cNvGrpSpPr/>
-        <p:nvPr/>
-      </p:nvGrpSpPr>
-      <p:grpSpPr>
-        <a:xfrm>
-          <a:off x="0" y="0"/>
-          <a:ext cx="0" cy="0"/>
-          <a:chOff x="0" y="0"/>
-          <a:chExt cx="0" cy="0"/>
-        </a:xfrm>
-      </p:grpSpPr>
-      <p:sp>
-        <p:nvSpPr>
-          <p:cNvPr id="2" name="Title 1">
-            <a:extLst>
-              <a:ext uri="{FF2B5EF4-FFF2-40B4-BE49-F238E27FC236}">
-                <a16:creationId xmlns:a16="http://schemas.microsoft.com/office/drawing/2014/main" id="{E48B336F-8447-8EB4-EB7B-101421B95037}"/>
-              </a:ext>
-            </a:extLst>
-          </p:cNvPr>
-          <p:cNvSpPr>
-            <a:spLocks noGrp="1"/>
-          </p:cNvSpPr>
-          <p:nvPr>
-            <p:ph type="title"/>
-          </p:nvPr>
-        </p:nvSpPr>
-        <p:spPr/>
-        <p:txBody>
-          <a:bodyPr/>
-          <a:lstStyle/>
-          <a:p>
-            <a:r>
-              <a:rPr lang="en-US" dirty="0"/>
-              <a:t>Evaluation metric (how to read the plots)</a:t>
-            </a:r>
-          </a:p>
-        </p:txBody>
-      </p:sp>
-      <p:sp>
-        <p:nvSpPr>
-          <p:cNvPr id="3" name="Content Placeholder 2">
-            <a:extLst>
-              <a:ext uri="{FF2B5EF4-FFF2-40B4-BE49-F238E27FC236}">
-                <a16:creationId xmlns:a16="http://schemas.microsoft.com/office/drawing/2014/main" id="{9FAB2746-36BB-F2E1-8503-46ACB1567FEE}"/>
-              </a:ext>
-            </a:extLst>
-          </p:cNvPr>
-          <p:cNvSpPr>
-            <a:spLocks noGrp="1"/>
-          </p:cNvSpPr>
-          <p:nvPr>
-            <p:ph idx="1"/>
-          </p:nvPr>
-        </p:nvSpPr>
-        <p:spPr/>
-        <p:txBody>
-          <a:bodyPr/>
-          <a:lstStyle/>
-          <a:p>
-            <a:r>
-              <a:rPr lang="en-US" dirty="0"/>
-              <a:t>Bland–Altman on log scale → report multiplicative 95% limits of agreement.</a:t>
-            </a:r>
-          </a:p>
-          <a:p>
-            <a:r>
-              <a:rPr lang="en-US" dirty="0"/>
-              <a:t>	•	Mean bias close to 1.0 indicates no systematic over/under‑estimation.</a:t>
-            </a:r>
-          </a:p>
-          <a:p>
-            <a:r>
-              <a:rPr lang="en-US" dirty="0"/>
-              <a:t>	•	Narrower limits = closer agreement to literature values across the range.</a:t>
-            </a:r>
-          </a:p>
-        </p:txBody>
-      </p:sp>
-    </p:spTree>
-    <p:extLst>
-      <p:ext uri="{BB962C8B-B14F-4D97-AF65-F5344CB8AC3E}">
-        <p14:creationId xmlns:p14="http://schemas.microsoft.com/office/powerpoint/2010/main" val="252468356"/>
-      </p:ext>
-    </p:extLst>
-  </p:cSld>
-  <p:clrMapOvr>
-    <a:masterClrMapping/>
-  </p:clrMapOvr>
-</p:sld>
-</file>
-
-<file path=ppt/slides/slide12.xml><?xml version="1.0" encoding="utf-8"?>
 <p:sld xmlns:a="http://schemas.openxmlformats.org/drawingml/2006/main" xmlns:r="http://schemas.openxmlformats.org/officeDocument/2006/relationships" xmlns:p="http://schemas.openxmlformats.org/presentationml/2006/main">
   <p:cSld>
     <p:spTree>
@@ -4574,37 +4270,37 @@
             <p:ph idx="1"/>
             <p:extLst>
               <p:ext uri="{D42A27DB-BD31-4B8C-83A1-F6EECF244321}">
-                <p14:modId xmlns:p14="http://schemas.microsoft.com/office/powerpoint/2010/main" val="2422026506"/>
+                <p14:modId xmlns:p14="http://schemas.microsoft.com/office/powerpoint/2010/main" val="3005683141"/>
               </p:ext>
             </p:extLst>
           </p:nvPr>
         </p:nvGraphicFramePr>
         <p:xfrm>
-          <a:off x="4540682" y="76200"/>
-          <a:ext cx="3997325" cy="1280160"/>
+          <a:off x="3686439" y="317000"/>
+          <a:ext cx="4470971" cy="1325562"/>
         </p:xfrm>
         <a:graphic>
           <a:graphicData uri="http://schemas.openxmlformats.org/drawingml/2006/table">
             <a:tbl>
               <a:tblPr firstRow="1" firstCol="1" bandRow="1">
-                <a:tableStyleId>{5C22544A-7EE6-4342-B048-85BDC9FD1C3A}</a:tableStyleId>
+                <a:tableStyleId>{D7AC3CCA-C797-4891-BE02-D94E43425B78}</a:tableStyleId>
               </a:tblPr>
               <a:tblGrid>
-                <a:gridCol w="755015">
+                <a:gridCol w="844477">
                   <a:extLst>
                     <a:ext uri="{9D8B030D-6E8A-4147-A177-3AD203B41FA5}">
                       <a16:colId xmlns:a16="http://schemas.microsoft.com/office/drawing/2014/main" val="3557303120"/>
                     </a:ext>
                   </a:extLst>
                 </a:gridCol>
-                <a:gridCol w="1584960">
+                <a:gridCol w="1772763">
                   <a:extLst>
                     <a:ext uri="{9D8B030D-6E8A-4147-A177-3AD203B41FA5}">
                       <a16:colId xmlns:a16="http://schemas.microsoft.com/office/drawing/2014/main" val="206299570"/>
                     </a:ext>
                   </a:extLst>
                 </a:gridCol>
-                <a:gridCol w="1657350">
+                <a:gridCol w="1853731">
                   <a:extLst>
                     <a:ext uri="{9D8B030D-6E8A-4147-A177-3AD203B41FA5}">
                       <a16:colId xmlns:a16="http://schemas.microsoft.com/office/drawing/2014/main" val="1560494471"/>
@@ -4612,7 +4308,7 @@
                   </a:extLst>
                 </a:gridCol>
               </a:tblGrid>
-              <a:tr h="0">
+              <a:tr h="378732">
                 <a:tc>
                   <a:txBody>
                     <a:bodyPr/>
@@ -4697,7 +4393,7 @@
                   </a:ext>
                 </a:extLst>
               </a:tr>
-              <a:tr h="0">
+              <a:tr h="189366">
                 <a:tc>
                   <a:txBody>
                     <a:bodyPr/>
@@ -4782,7 +4478,7 @@
                   </a:ext>
                 </a:extLst>
               </a:tr>
-              <a:tr h="0">
+              <a:tr h="189366">
                 <a:tc>
                   <a:txBody>
                     <a:bodyPr/>
@@ -4867,7 +4563,7 @@
                   </a:ext>
                 </a:extLst>
               </a:tr>
-              <a:tr h="0">
+              <a:tr h="189366">
                 <a:tc>
                   <a:txBody>
                     <a:bodyPr/>
@@ -4903,12 +4599,12 @@
                         <a:buNone/>
                       </a:pPr>
                       <a:r>
-                        <a:rPr lang="en-US" sz="1200" kern="100">
+                        <a:rPr lang="en-US" sz="1200" kern="100" dirty="0">
                           <a:effectLst/>
                         </a:rPr>
                         <a:t>0.33x (0.30x - 0.35x)</a:t>
                       </a:r>
-                      <a:endParaRPr lang="en-US" sz="1200" kern="100">
+                      <a:endParaRPr lang="en-US" sz="1200" kern="100" dirty="0">
                         <a:solidFill>
                           <a:srgbClr val="000000"/>
                         </a:solidFill>
@@ -4952,7 +4648,7 @@
                   </a:ext>
                 </a:extLst>
               </a:tr>
-              <a:tr h="0">
+              <a:tr h="189366">
                 <a:tc>
                   <a:txBody>
                     <a:bodyPr/>
@@ -5037,7 +4733,7 @@
                   </a:ext>
                 </a:extLst>
               </a:tr>
-              <a:tr h="0">
+              <a:tr h="189366">
                 <a:tc>
                   <a:txBody>
                     <a:bodyPr/>
@@ -5169,7 +4865,7 @@
 </p:sld>
 </file>
 
-<file path=ppt/slides/slide13.xml><?xml version="1.0" encoding="utf-8"?>
+<file path=ppt/slides/slide11.xml><?xml version="1.0" encoding="utf-8"?>
 <p:sld xmlns:a="http://schemas.openxmlformats.org/drawingml/2006/main" xmlns:r="http://schemas.openxmlformats.org/officeDocument/2006/relationships" xmlns:p="http://schemas.openxmlformats.org/presentationml/2006/main">
   <p:cSld>
     <p:spTree>
@@ -5236,7 +4932,7 @@
         </p:blipFill>
         <p:spPr>
           <a:xfrm>
-            <a:off x="3399155" y="1690688"/>
+            <a:off x="978858" y="1570508"/>
             <a:ext cx="5393690" cy="4897755"/>
           </a:xfrm>
           <a:prstGeom prst="rect">
@@ -5244,6 +4940,147 @@
           </a:prstGeom>
         </p:spPr>
       </p:pic>
+      <p:sp>
+        <p:nvSpPr>
+          <p:cNvPr id="5" name="TextBox 4">
+            <a:extLst>
+              <a:ext uri="{FF2B5EF4-FFF2-40B4-BE49-F238E27FC236}">
+                <a16:creationId xmlns:a16="http://schemas.microsoft.com/office/drawing/2014/main" id="{A7BF4697-B517-0F21-AD5F-021F1CB9BABD}"/>
+              </a:ext>
+            </a:extLst>
+          </p:cNvPr>
+          <p:cNvSpPr txBox="1"/>
+          <p:nvPr/>
+        </p:nvSpPr>
+        <p:spPr>
+          <a:xfrm>
+            <a:off x="6513206" y="2597983"/>
+            <a:ext cx="6098058" cy="1719381"/>
+          </a:xfrm>
+          <a:prstGeom prst="rect">
+            <a:avLst/>
+          </a:prstGeom>
+          <a:noFill/>
+        </p:spPr>
+        <p:txBody>
+          <a:bodyPr wrap="square">
+            <a:spAutoFit/>
+          </a:bodyPr>
+          <a:lstStyle/>
+          <a:p>
+            <a:pPr>
+              <a:lnSpc>
+                <a:spcPts val="1350"/>
+              </a:lnSpc>
+              <a:buNone/>
+            </a:pPr>
+            <a:r>
+              <a:rPr lang="en-US" dirty="0"/>
+              <a:t>LR evidence bands (reference):</a:t>
+            </a:r>
+          </a:p>
+          <a:p>
+            <a:pPr>
+              <a:lnSpc>
+                <a:spcPts val="1350"/>
+              </a:lnSpc>
+              <a:buNone/>
+            </a:pPr>
+            <a:endParaRPr lang="en-US" dirty="0"/>
+          </a:p>
+          <a:p>
+            <a:pPr marL="285750" indent="-285750">
+              <a:lnSpc>
+                <a:spcPts val="1350"/>
+              </a:lnSpc>
+              <a:buFont typeface="Arial" panose="020B0604020202020204" pitchFamily="34" charset="0"/>
+              <a:buChar char="•"/>
+            </a:pPr>
+            <a:r>
+              <a:rPr lang="en-US" dirty="0"/>
+              <a:t>&gt;10 strong for; </a:t>
+            </a:r>
+          </a:p>
+          <a:p>
+            <a:pPr marL="285750" indent="-285750">
+              <a:lnSpc>
+                <a:spcPts val="1350"/>
+              </a:lnSpc>
+              <a:buFont typeface="Arial" panose="020B0604020202020204" pitchFamily="34" charset="0"/>
+              <a:buChar char="•"/>
+            </a:pPr>
+            <a:r>
+              <a:rPr lang="en-US" dirty="0"/>
+              <a:t>5-10 moderate for; </a:t>
+            </a:r>
+          </a:p>
+          <a:p>
+            <a:pPr marL="285750" indent="-285750">
+              <a:lnSpc>
+                <a:spcPts val="1350"/>
+              </a:lnSpc>
+              <a:buFont typeface="Arial" panose="020B0604020202020204" pitchFamily="34" charset="0"/>
+              <a:buChar char="•"/>
+            </a:pPr>
+            <a:r>
+              <a:rPr lang="en-US" dirty="0"/>
+              <a:t>2–5 weak for;</a:t>
+            </a:r>
+          </a:p>
+          <a:p>
+            <a:pPr marL="285750" indent="-285750">
+              <a:lnSpc>
+                <a:spcPts val="1350"/>
+              </a:lnSpc>
+              <a:buFont typeface="Arial" panose="020B0604020202020204" pitchFamily="34" charset="0"/>
+              <a:buChar char="•"/>
+            </a:pPr>
+            <a:r>
+              <a:rPr lang="en-US" dirty="0"/>
+              <a:t>0.5–2 negligible;</a:t>
+            </a:r>
+          </a:p>
+          <a:p>
+            <a:pPr marL="285750" indent="-285750">
+              <a:lnSpc>
+                <a:spcPts val="1350"/>
+              </a:lnSpc>
+              <a:buFont typeface="Arial" panose="020B0604020202020204" pitchFamily="34" charset="0"/>
+              <a:buChar char="•"/>
+            </a:pPr>
+            <a:r>
+              <a:rPr lang="en-US" dirty="0"/>
+              <a:t>0.2-0.5 weak against; </a:t>
+            </a:r>
+          </a:p>
+          <a:p>
+            <a:pPr marL="285750" indent="-285750">
+              <a:lnSpc>
+                <a:spcPts val="1350"/>
+              </a:lnSpc>
+              <a:buFont typeface="Arial" panose="020B0604020202020204" pitchFamily="34" charset="0"/>
+              <a:buChar char="•"/>
+            </a:pPr>
+            <a:r>
+              <a:rPr lang="en-US" dirty="0"/>
+              <a:t>0.1-0.2 moderate against; </a:t>
+            </a:r>
+          </a:p>
+          <a:p>
+            <a:pPr marL="285750" indent="-285750">
+              <a:lnSpc>
+                <a:spcPts val="1350"/>
+              </a:lnSpc>
+              <a:buFont typeface="Arial" panose="020B0604020202020204" pitchFamily="34" charset="0"/>
+              <a:buChar char="•"/>
+            </a:pPr>
+            <a:r>
+              <a:rPr lang="en-US" dirty="0"/>
+              <a:t>≤0.1 strong against</a:t>
+            </a:r>
+          </a:p>
+        </p:txBody>
+      </p:sp>
     </p:spTree>
     <p:extLst>
       <p:ext uri="{BB962C8B-B14F-4D97-AF65-F5344CB8AC3E}">
@@ -5257,7 +5094,7 @@
 </p:sld>
 </file>
 
-<file path=ppt/slides/slide14.xml><?xml version="1.0" encoding="utf-8"?>
+<file path=ppt/slides/slide12.xml><?xml version="1.0" encoding="utf-8"?>
 <p:sld xmlns:a="http://schemas.openxmlformats.org/drawingml/2006/main" xmlns:r="http://schemas.openxmlformats.org/officeDocument/2006/relationships" xmlns:p="http://schemas.openxmlformats.org/presentationml/2006/main">
   <p:cSld>
     <p:spTree>
@@ -5308,31 +5145,6 @@
           </a:p>
         </p:txBody>
       </p:sp>
-      <p:sp>
-        <p:nvSpPr>
-          <p:cNvPr id="3" name="Content Placeholder 2">
-            <a:extLst>
-              <a:ext uri="{FF2B5EF4-FFF2-40B4-BE49-F238E27FC236}">
-                <a16:creationId xmlns:a16="http://schemas.microsoft.com/office/drawing/2014/main" id="{C9DA7938-2C7B-CB54-18B3-AA455A432931}"/>
-              </a:ext>
-            </a:extLst>
-          </p:cNvPr>
-          <p:cNvSpPr>
-            <a:spLocks noGrp="1"/>
-          </p:cNvSpPr>
-          <p:nvPr>
-            <p:ph idx="1"/>
-          </p:nvPr>
-        </p:nvSpPr>
-        <p:spPr/>
-        <p:txBody>
-          <a:bodyPr/>
-          <a:lstStyle/>
-          <a:p>
-            <a:endParaRPr lang="en-US" dirty="0"/>
-          </a:p>
-        </p:txBody>
-      </p:sp>
       <p:pic>
         <p:nvPicPr>
           <p:cNvPr id="5" name="Picture 4" descr="A screenshot of a graph&#10;&#10;AI-generated content may be incorrect.">
@@ -5355,8 +5167,8 @@
         </p:blipFill>
         <p:spPr>
           <a:xfrm>
-            <a:off x="3124200" y="-278130"/>
-            <a:ext cx="5943600" cy="7414260"/>
+            <a:off x="2995863" y="149145"/>
+            <a:ext cx="5378116" cy="6708855"/>
           </a:xfrm>
           <a:prstGeom prst="rect">
             <a:avLst/>
@@ -5376,7 +5188,7 @@
 </p:sld>
 </file>
 
-<file path=ppt/slides/slide15.xml><?xml version="1.0" encoding="utf-8"?>
+<file path=ppt/slides/slide13.xml><?xml version="1.0" encoding="utf-8"?>
 <p:sld xmlns:a="http://schemas.openxmlformats.org/drawingml/2006/main" xmlns:r="http://schemas.openxmlformats.org/officeDocument/2006/relationships" xmlns:p="http://schemas.openxmlformats.org/presentationml/2006/main">
   <p:cSld>
     <p:spTree>
@@ -5427,31 +5239,6 @@
           </a:p>
         </p:txBody>
       </p:sp>
-      <p:sp>
-        <p:nvSpPr>
-          <p:cNvPr id="3" name="Content Placeholder 2">
-            <a:extLst>
-              <a:ext uri="{FF2B5EF4-FFF2-40B4-BE49-F238E27FC236}">
-                <a16:creationId xmlns:a16="http://schemas.microsoft.com/office/drawing/2014/main" id="{BBFA5931-03F3-E81A-D8BF-64B9685B58E4}"/>
-              </a:ext>
-            </a:extLst>
-          </p:cNvPr>
-          <p:cNvSpPr>
-            <a:spLocks noGrp="1"/>
-          </p:cNvSpPr>
-          <p:nvPr>
-            <p:ph idx="1"/>
-          </p:nvPr>
-        </p:nvSpPr>
-        <p:spPr/>
-        <p:txBody>
-          <a:bodyPr/>
-          <a:lstStyle/>
-          <a:p>
-            <a:endParaRPr lang="en-US" dirty="0"/>
-          </a:p>
-        </p:txBody>
-      </p:sp>
       <p:pic>
         <p:nvPicPr>
           <p:cNvPr id="4" name="Picture 3" descr="A group of colored dots&#10;&#10;AI-generated content may be incorrect.">
@@ -5474,8 +5261,8 @@
         </p:blipFill>
         <p:spPr>
           <a:xfrm>
-            <a:off x="3124200" y="1844675"/>
-            <a:ext cx="5943600" cy="3168650"/>
+            <a:off x="1331495" y="1399507"/>
+            <a:ext cx="9569116" cy="5101484"/>
           </a:xfrm>
           <a:prstGeom prst="rect">
             <a:avLst/>
@@ -5495,7 +5282,7 @@
 </p:sld>
 </file>
 
-<file path=ppt/slides/slide16.xml><?xml version="1.0" encoding="utf-8"?>
+<file path=ppt/slides/slide14.xml><?xml version="1.0" encoding="utf-8"?>
 <p:sld xmlns:a="http://schemas.openxmlformats.org/drawingml/2006/main" xmlns:r="http://schemas.openxmlformats.org/officeDocument/2006/relationships" xmlns:p="http://schemas.openxmlformats.org/presentationml/2006/main">
   <p:cSld>
     <p:spTree>
@@ -5546,31 +5333,6 @@
           </a:p>
         </p:txBody>
       </p:sp>
-      <p:sp>
-        <p:nvSpPr>
-          <p:cNvPr id="3" name="Content Placeholder 2">
-            <a:extLst>
-              <a:ext uri="{FF2B5EF4-FFF2-40B4-BE49-F238E27FC236}">
-                <a16:creationId xmlns:a16="http://schemas.microsoft.com/office/drawing/2014/main" id="{1BF13CF6-1D07-499F-C2A3-30A9C91195CF}"/>
-              </a:ext>
-            </a:extLst>
-          </p:cNvPr>
-          <p:cNvSpPr>
-            <a:spLocks noGrp="1"/>
-          </p:cNvSpPr>
-          <p:nvPr>
-            <p:ph idx="1"/>
-          </p:nvPr>
-        </p:nvSpPr>
-        <p:spPr/>
-        <p:txBody>
-          <a:bodyPr/>
-          <a:lstStyle/>
-          <a:p>
-            <a:endParaRPr lang="en-US" dirty="0"/>
-          </a:p>
-        </p:txBody>
-      </p:sp>
       <p:pic>
         <p:nvPicPr>
           <p:cNvPr id="4" name="Picture 3">
@@ -5593,8 +5355,8 @@
         </p:blipFill>
         <p:spPr>
           <a:xfrm>
-            <a:off x="3892550" y="1155700"/>
-            <a:ext cx="4406900" cy="4546600"/>
+            <a:off x="3146592" y="698500"/>
+            <a:ext cx="5816934" cy="6001332"/>
           </a:xfrm>
           <a:prstGeom prst="rect">
             <a:avLst/>
@@ -5614,96 +5376,7 @@
 </p:sld>
 </file>
 
-<file path=ppt/slides/slide17.xml><?xml version="1.0" encoding="utf-8"?>
-<p:sld xmlns:a="http://schemas.openxmlformats.org/drawingml/2006/main" xmlns:r="http://schemas.openxmlformats.org/officeDocument/2006/relationships" xmlns:p="http://schemas.openxmlformats.org/presentationml/2006/main">
-  <p:cSld>
-    <p:spTree>
-      <p:nvGrpSpPr>
-        <p:cNvPr id="1" name="">
-          <a:extLst>
-            <a:ext uri="{FF2B5EF4-FFF2-40B4-BE49-F238E27FC236}">
-              <a16:creationId xmlns:a16="http://schemas.microsoft.com/office/drawing/2014/main" id="{1DF1258D-DFF6-26E2-6AEC-61BD5BF389B3}"/>
-            </a:ext>
-          </a:extLst>
-        </p:cNvPr>
-        <p:cNvGrpSpPr/>
-        <p:nvPr/>
-      </p:nvGrpSpPr>
-      <p:grpSpPr>
-        <a:xfrm>
-          <a:off x="0" y="0"/>
-          <a:ext cx="0" cy="0"/>
-          <a:chOff x="0" y="0"/>
-          <a:chExt cx="0" cy="0"/>
-        </a:xfrm>
-      </p:grpSpPr>
-      <p:sp>
-        <p:nvSpPr>
-          <p:cNvPr id="2" name="Title 1">
-            <a:extLst>
-              <a:ext uri="{FF2B5EF4-FFF2-40B4-BE49-F238E27FC236}">
-                <a16:creationId xmlns:a16="http://schemas.microsoft.com/office/drawing/2014/main" id="{05DE5810-9E29-0EFC-921A-BC6AFDE509F5}"/>
-              </a:ext>
-            </a:extLst>
-          </p:cNvPr>
-          <p:cNvSpPr>
-            <a:spLocks noGrp="1"/>
-          </p:cNvSpPr>
-          <p:nvPr>
-            <p:ph type="title"/>
-          </p:nvPr>
-        </p:nvSpPr>
-        <p:spPr/>
-        <p:txBody>
-          <a:bodyPr/>
-          <a:lstStyle/>
-          <a:p>
-            <a:r>
-              <a:rPr lang="en-US" dirty="0"/>
-              <a:t>Conclusions</a:t>
-            </a:r>
-          </a:p>
-        </p:txBody>
-      </p:sp>
-      <p:sp>
-        <p:nvSpPr>
-          <p:cNvPr id="3" name="Content Placeholder 2">
-            <a:extLst>
-              <a:ext uri="{FF2B5EF4-FFF2-40B4-BE49-F238E27FC236}">
-                <a16:creationId xmlns:a16="http://schemas.microsoft.com/office/drawing/2014/main" id="{70E2967F-FD6A-2DF7-3861-33151FEA3E57}"/>
-              </a:ext>
-            </a:extLst>
-          </p:cNvPr>
-          <p:cNvSpPr>
-            <a:spLocks noGrp="1"/>
-          </p:cNvSpPr>
-          <p:nvPr>
-            <p:ph idx="1"/>
-          </p:nvPr>
-        </p:nvSpPr>
-        <p:spPr/>
-        <p:txBody>
-          <a:bodyPr/>
-          <a:lstStyle/>
-          <a:p>
-            <a:endParaRPr lang="en-US" dirty="0"/>
-          </a:p>
-        </p:txBody>
-      </p:sp>
-    </p:spTree>
-    <p:extLst>
-      <p:ext uri="{BB962C8B-B14F-4D97-AF65-F5344CB8AC3E}">
-        <p14:creationId xmlns:p14="http://schemas.microsoft.com/office/powerpoint/2010/main" val="4185794752"/>
-      </p:ext>
-    </p:extLst>
-  </p:cSld>
-  <p:clrMapOvr>
-    <a:masterClrMapping/>
-  </p:clrMapOvr>
-</p:sld>
-</file>
-
-<file path=ppt/slides/slide18.xml><?xml version="1.0" encoding="utf-8"?>
+<file path=ppt/slides/slide15.xml><?xml version="1.0" encoding="utf-8"?>
 <p:sld xmlns:a="http://schemas.openxmlformats.org/drawingml/2006/main" xmlns:r="http://schemas.openxmlformats.org/officeDocument/2006/relationships" xmlns:p="http://schemas.openxmlformats.org/presentationml/2006/main">
   <p:cSld>
     <p:spTree>
@@ -5749,7 +5422,7 @@
           <a:p>
             <a:r>
               <a:rPr lang="en-US" dirty="0"/>
-              <a:t>Limitations</a:t>
+              <a:t>Conclusion</a:t>
             </a:r>
           </a:p>
         </p:txBody>
@@ -5772,37 +5445,41 @@
         </p:nvSpPr>
         <p:spPr/>
         <p:txBody>
-          <a:bodyPr/>
+          <a:bodyPr>
+            <a:normAutofit fontScale="92500"/>
+          </a:bodyPr>
           <a:lstStyle/>
           <a:p>
             <a:r>
-              <a:rPr lang="en-US" b="1" dirty="0"/>
-              <a:t>Contamination risk → prospective benchmarks → clinical impact</a:t>
-            </a:r>
-            <a:endParaRPr lang="en-US" dirty="0"/>
-          </a:p>
-          <a:p>
-            <a:r>
               <a:rPr lang="en-US" dirty="0"/>
-              <a:t>Contamination: </a:t>
-            </a:r>
-            <a:r>
-              <a:rPr lang="en-US" dirty="0" err="1"/>
-              <a:t>TheNNT</a:t>
-            </a:r>
+              <a:t>“We found that LLMs estimated diagnostic LRs with negligible mean bias and bounded dispersion, with the newest model, GPT-5, showing the closest agreement with literature-reported values (95% limits of agreement of 0.26×–3.70×). </a:t>
+            </a:r>
+          </a:p>
+          <a:p>
             <a:r>
               <a:rPr lang="en-US" dirty="0"/>
-              <a:t> LRs likely present in pretraining; some agreement may reflect prior exposure.</a:t>
+              <a:t>Agreement varied by finding type, with laboratory test results showing looser agreement than history, signs/symptoms, or imaging results. </a:t>
             </a:r>
           </a:p>
           <a:p>
             <a:r>
               <a:rPr lang="en-US" dirty="0"/>
-              <a:t>Remedy: leakage‑controlled, embargoed targets; preregistration; measure true prospective prediction.</a:t>
-            </a:r>
-          </a:p>
-          <a:p>
-            <a:endParaRPr lang="en-US" dirty="0"/>
+              <a:t>Qualitative category agreement was substantial (</a:t>
+            </a:r>
+            <a:r>
+              <a:rPr lang="el-GR" dirty="0"/>
+              <a:t>κ = 0.78 </a:t>
+            </a:r>
+            <a:r>
+              <a:rPr lang="en-US" dirty="0"/>
+              <a:t>for GPT-5).</a:t>
+            </a:r>
+          </a:p>
+          <a:p>
+            <a:r>
+              <a:rPr lang="en-US" dirty="0"/>
+              <a:t>Together, these results suggest LLM-estimated LRs can support Bayesian reasoning when empirical LRs are absent, inapplicable, or uncertain.”</a:t>
+            </a:r>
           </a:p>
         </p:txBody>
       </p:sp>
@@ -5819,7 +5496,121 @@
 </p:sld>
 </file>
 
-<file path=ppt/slides/slide19.xml><?xml version="1.0" encoding="utf-8"?>
+<file path=ppt/slides/slide16.xml><?xml version="1.0" encoding="utf-8"?>
+<p:sld xmlns:a="http://schemas.openxmlformats.org/drawingml/2006/main" xmlns:r="http://schemas.openxmlformats.org/officeDocument/2006/relationships" xmlns:p="http://schemas.openxmlformats.org/presentationml/2006/main">
+  <p:cSld>
+    <p:spTree>
+      <p:nvGrpSpPr>
+        <p:cNvPr id="1" name="">
+          <a:extLst>
+            <a:ext uri="{FF2B5EF4-FFF2-40B4-BE49-F238E27FC236}">
+              <a16:creationId xmlns:a16="http://schemas.microsoft.com/office/drawing/2014/main" id="{0D16A5E0-B731-F948-3929-B03C70539D66}"/>
+            </a:ext>
+          </a:extLst>
+        </p:cNvPr>
+        <p:cNvGrpSpPr/>
+        <p:nvPr/>
+      </p:nvGrpSpPr>
+      <p:grpSpPr>
+        <a:xfrm>
+          <a:off x="0" y="0"/>
+          <a:ext cx="0" cy="0"/>
+          <a:chOff x="0" y="0"/>
+          <a:chExt cx="0" cy="0"/>
+        </a:xfrm>
+      </p:grpSpPr>
+      <p:sp>
+        <p:nvSpPr>
+          <p:cNvPr id="2" name="Title 1">
+            <a:extLst>
+              <a:ext uri="{FF2B5EF4-FFF2-40B4-BE49-F238E27FC236}">
+                <a16:creationId xmlns:a16="http://schemas.microsoft.com/office/drawing/2014/main" id="{158E8520-A066-39EF-90EA-C66BA589D513}"/>
+              </a:ext>
+            </a:extLst>
+          </p:cNvPr>
+          <p:cNvSpPr>
+            <a:spLocks noGrp="1"/>
+          </p:cNvSpPr>
+          <p:nvPr>
+            <p:ph type="title"/>
+          </p:nvPr>
+        </p:nvSpPr>
+        <p:spPr/>
+        <p:txBody>
+          <a:bodyPr/>
+          <a:lstStyle/>
+          <a:p>
+            <a:r>
+              <a:rPr lang="en-US" dirty="0"/>
+              <a:t>Limitations</a:t>
+            </a:r>
+          </a:p>
+        </p:txBody>
+      </p:sp>
+      <p:sp>
+        <p:nvSpPr>
+          <p:cNvPr id="3" name="Content Placeholder 2">
+            <a:extLst>
+              <a:ext uri="{FF2B5EF4-FFF2-40B4-BE49-F238E27FC236}">
+                <a16:creationId xmlns:a16="http://schemas.microsoft.com/office/drawing/2014/main" id="{83AEC3D5-2A50-1272-F146-21C2AAA2A8DA}"/>
+              </a:ext>
+            </a:extLst>
+          </p:cNvPr>
+          <p:cNvSpPr>
+            <a:spLocks noGrp="1"/>
+          </p:cNvSpPr>
+          <p:nvPr>
+            <p:ph idx="1"/>
+          </p:nvPr>
+        </p:nvSpPr>
+        <p:spPr/>
+        <p:txBody>
+          <a:bodyPr/>
+          <a:lstStyle/>
+          <a:p>
+            <a:r>
+              <a:rPr lang="en-US" dirty="0"/>
+              <a:t>Contamination: </a:t>
+            </a:r>
+            <a:r>
+              <a:rPr lang="en-US" dirty="0" err="1"/>
+              <a:t>TheNNT</a:t>
+            </a:r>
+            <a:r>
+              <a:rPr lang="en-US" dirty="0"/>
+              <a:t> LRs likely present in pretraining; some agreement may reflect prior exposure.</a:t>
+            </a:r>
+          </a:p>
+          <a:p>
+            <a:pPr lvl="1"/>
+            <a:r>
+              <a:rPr lang="en-US" dirty="0"/>
+              <a:t>Minimal Regurgitation</a:t>
+            </a:r>
+          </a:p>
+          <a:p>
+            <a:pPr lvl="1"/>
+            <a:r>
+              <a:rPr lang="en-US" dirty="0"/>
+              <a:t>Influence on weights in the training data?</a:t>
+            </a:r>
+          </a:p>
+        </p:txBody>
+      </p:sp>
+    </p:spTree>
+    <p:extLst>
+      <p:ext uri="{BB962C8B-B14F-4D97-AF65-F5344CB8AC3E}">
+        <p14:creationId xmlns:p14="http://schemas.microsoft.com/office/powerpoint/2010/main" val="3512676616"/>
+      </p:ext>
+    </p:extLst>
+  </p:cSld>
+  <p:clrMapOvr>
+    <a:masterClrMapping/>
+  </p:clrMapOvr>
+</p:sld>
+</file>
+
+<file path=ppt/slides/slide17.xml><?xml version="1.0" encoding="utf-8"?>
 <p:sld xmlns:a="http://schemas.openxmlformats.org/drawingml/2006/main" xmlns:r="http://schemas.openxmlformats.org/officeDocument/2006/relationships" xmlns:p="http://schemas.openxmlformats.org/presentationml/2006/main">
   <p:cSld>
     <p:spTree>
@@ -5897,7 +5688,18 @@
             </a:r>
           </a:p>
           <a:p>
-            <a:endParaRPr lang="en-US" dirty="0"/>
+            <a:pPr lvl="1"/>
+            <a:r>
+              <a:rPr lang="en-US" dirty="0"/>
+              <a:t>Likely less useful for estimating a single key finding then multiple findings that are then chained together.</a:t>
+            </a:r>
+          </a:p>
+          <a:p>
+            <a:pPr lvl="1"/>
+            <a:r>
+              <a:rPr lang="en-US" dirty="0"/>
+              <a:t>”Naïve Bayes Miracle”</a:t>
+            </a:r>
           </a:p>
         </p:txBody>
       </p:sp>
@@ -5985,26 +5787,43 @@
           <a:lstStyle/>
           <a:p>
             <a:r>
+              <a:rPr lang="en-US" u="sng" dirty="0"/>
+              <a:t>Problem: </a:t>
+            </a:r>
+            <a:r>
               <a:rPr lang="en-US" dirty="0"/>
-              <a:t>Problem: Bayesian diagnosis requires usable likelihood ratios (LRs).</a:t>
-            </a:r>
-          </a:p>
-          <a:p>
+              <a:t>Bayesian reasoning requires likelihood ratios (LRs).</a:t>
+            </a:r>
+          </a:p>
+          <a:p>
+            <a:r>
+              <a:rPr lang="en-US" u="sng" dirty="0"/>
+              <a:t>Approach: </a:t>
+            </a:r>
             <a:r>
               <a:rPr lang="en-US" dirty="0"/>
-              <a:t>Claim: Modern large language models (LLMs) approximate diagnostic LRs with negligible bias and bounded dispersion.</a:t>
-            </a:r>
-          </a:p>
-          <a:p>
+              <a:t>Ask LLMs to estimate LRs for findings.</a:t>
+            </a:r>
+          </a:p>
+          <a:p>
+            <a:r>
+              <a:rPr lang="en-US" u="sng" dirty="0"/>
+              <a:t>Claim: </a:t>
+            </a:r>
             <a:r>
               <a:rPr lang="en-US" dirty="0"/>
-              <a:t>Payoff: Understandable approximate evidence weights for clinical reasoning when empiric ones not </a:t>
-            </a:r>
-            <a:r>
-              <a:rPr lang="en-US" dirty="0" err="1"/>
-              <a:t>availab.e</a:t>
-            </a:r>
-            <a:endParaRPr lang="en-US" dirty="0"/>
+              <a:t>Modern large language models (LLMs) approximate diagnostic LRs with negligible bias and bounded dispersion.</a:t>
+            </a:r>
+          </a:p>
+          <a:p>
+            <a:r>
+              <a:rPr lang="en-US" u="sng" dirty="0"/>
+              <a:t>Payoff:</a:t>
+            </a:r>
+            <a:r>
+              <a:rPr lang="en-US" dirty="0"/>
+              <a:t> Usable evidence weights when data are thin.</a:t>
+            </a:r>
           </a:p>
         </p:txBody>
       </p:sp>
@@ -6088,42 +5907,188 @@
             <p:ph idx="1"/>
           </p:nvPr>
         </p:nvSpPr>
-        <p:spPr/>
-        <p:txBody>
-          <a:bodyPr/>
+        <p:spPr>
+          <a:xfrm>
+            <a:off x="838200" y="1825625"/>
+            <a:ext cx="5731042" cy="4351338"/>
+          </a:xfrm>
+        </p:spPr>
+        <p:txBody>
+          <a:bodyPr>
+            <a:normAutofit lnSpcReduction="10000"/>
+          </a:bodyPr>
           <a:lstStyle/>
           <a:p>
             <a:r>
               <a:rPr lang="en-US" dirty="0"/>
-              <a:t>Inputs: pretest probability, clinical finding, LR.</a:t>
-            </a:r>
-          </a:p>
-          <a:p>
+              <a:t>Pretest odds × LR = Posterior odds</a:t>
+            </a:r>
+          </a:p>
+          <a:p>
+            <a:pPr lvl="1"/>
             <a:r>
               <a:rPr lang="en-US" dirty="0"/>
-              <a:t>	•	Mechanic: posterior odds = pretest odds × LR; convert back to probability.</a:t>
-            </a:r>
-          </a:p>
-          <a:p>
+              <a:t>Why LRs? portable across pretest; multiplicative; chain rule</a:t>
+            </a:r>
+          </a:p>
+          <a:p>
+            <a:pPr lvl="1"/>
             <a:r>
               <a:rPr lang="en-US" dirty="0"/>
-              <a:t>	•	Why LRs: portable across pretest settings; multiplicative; composable across findings.</a:t>
-            </a:r>
-          </a:p>
-          <a:p>
+              <a:t>Limitations: assumed LR independence, LR spectrum</a:t>
+            </a:r>
+          </a:p>
+          <a:p>
+            <a:pPr lvl="1"/>
+            <a:endParaRPr lang="en-US" dirty="0"/>
+          </a:p>
+          <a:p>
+            <a:pPr marL="0" indent="0">
+              <a:buNone/>
+            </a:pPr>
             <a:r>
               <a:rPr lang="en-US" dirty="0"/>
-              <a:t>	•	Limitation to flag: dependence among findings can bias serial updates.  ￼</a:t>
-            </a:r>
-          </a:p>
-          <a:p>
+              <a:t>Example: </a:t>
+            </a:r>
+          </a:p>
+          <a:p>
+            <a:pPr marL="457200" lvl="1" indent="0">
+              <a:buNone/>
+            </a:pPr>
             <a:r>
               <a:rPr lang="en-US" dirty="0"/>
-              <a:t>Visual: one “odds × LR → posterior odds” strip with 1–2 worked examples.</a:t>
-            </a:r>
-          </a:p>
-        </p:txBody>
-      </p:sp>
+              <a:t>Pre-test Probability = 0.7; LR = 2</a:t>
+            </a:r>
+          </a:p>
+          <a:p>
+            <a:pPr marL="457200" lvl="1" indent="0">
+              <a:buNone/>
+            </a:pPr>
+            <a:r>
+              <a:rPr lang="en-US" dirty="0"/>
+              <a:t>Pre-test Odds = 0.7/0.3 = 2.33</a:t>
+            </a:r>
+          </a:p>
+          <a:p>
+            <a:pPr marL="457200" lvl="1" indent="0">
+              <a:buNone/>
+            </a:pPr>
+            <a:r>
+              <a:rPr lang="en-US" dirty="0"/>
+              <a:t>Post-test Odds = 2.33 * 2 = 4.66</a:t>
+            </a:r>
+          </a:p>
+          <a:p>
+            <a:pPr marL="457200" lvl="1" indent="0">
+              <a:buNone/>
+            </a:pPr>
+            <a:r>
+              <a:rPr lang="en-US" dirty="0"/>
+              <a:t>Post-test Probability = .833</a:t>
+            </a:r>
+          </a:p>
+          <a:p>
+            <a:pPr marL="457200" lvl="1" indent="0">
+              <a:buNone/>
+            </a:pPr>
+            <a:endParaRPr lang="en-US" dirty="0"/>
+          </a:p>
+        </p:txBody>
+      </p:sp>
+      <p:pic>
+        <p:nvPicPr>
+          <p:cNvPr id="1026" name="Picture 2">
+            <a:extLst>
+              <a:ext uri="{FF2B5EF4-FFF2-40B4-BE49-F238E27FC236}">
+                <a16:creationId xmlns:a16="http://schemas.microsoft.com/office/drawing/2014/main" id="{FB0DFD9B-70B3-CCEC-31F4-CA78EB9A3062}"/>
+              </a:ext>
+            </a:extLst>
+          </p:cNvPr>
+          <p:cNvPicPr>
+            <a:picLocks noChangeAspect="1" noChangeArrowheads="1"/>
+          </p:cNvPicPr>
+          <p:nvPr/>
+        </p:nvPicPr>
+        <p:blipFill>
+          <a:blip r:embed="rId3">
+            <a:extLst>
+              <a:ext uri="{28A0092B-C50C-407E-A947-70E740481C1C}">
+                <a14:useLocalDpi xmlns:a14="http://schemas.microsoft.com/office/drawing/2010/main" val="0"/>
+              </a:ext>
+            </a:extLst>
+          </a:blip>
+          <a:srcRect/>
+          <a:stretch>
+            <a:fillRect/>
+          </a:stretch>
+        </p:blipFill>
+        <p:spPr bwMode="auto">
+          <a:xfrm>
+            <a:off x="6541602" y="681036"/>
+            <a:ext cx="5576370" cy="2716693"/>
+          </a:xfrm>
+          <a:prstGeom prst="rect">
+            <a:avLst/>
+          </a:prstGeom>
+          <a:noFill/>
+          <a:extLst>
+            <a:ext uri="{909E8E84-426E-40DD-AFC4-6F175D3DCCD1}">
+              <a14:hiddenFill xmlns:a14="http://schemas.microsoft.com/office/drawing/2010/main">
+                <a:solidFill>
+                  <a:srgbClr val="FFFFFF"/>
+                </a:solidFill>
+              </a14:hiddenFill>
+            </a:ext>
+          </a:extLst>
+        </p:spPr>
+      </p:pic>
+      <p:pic>
+        <p:nvPicPr>
+          <p:cNvPr id="1028" name="Picture 4">
+            <a:extLst>
+              <a:ext uri="{FF2B5EF4-FFF2-40B4-BE49-F238E27FC236}">
+                <a16:creationId xmlns:a16="http://schemas.microsoft.com/office/drawing/2014/main" id="{9B22A3AD-9F8A-9629-7E7A-2518CF76D0A3}"/>
+              </a:ext>
+            </a:extLst>
+          </p:cNvPr>
+          <p:cNvPicPr>
+            <a:picLocks noChangeAspect="1" noChangeArrowheads="1"/>
+          </p:cNvPicPr>
+          <p:nvPr/>
+        </p:nvPicPr>
+        <p:blipFill>
+          <a:blip r:embed="rId4">
+            <a:extLst>
+              <a:ext uri="{28A0092B-C50C-407E-A947-70E740481C1C}">
+                <a14:useLocalDpi xmlns:a14="http://schemas.microsoft.com/office/drawing/2010/main" val="0"/>
+              </a:ext>
+            </a:extLst>
+          </a:blip>
+          <a:srcRect/>
+          <a:stretch>
+            <a:fillRect/>
+          </a:stretch>
+        </p:blipFill>
+        <p:spPr bwMode="auto">
+          <a:xfrm>
+            <a:off x="6541602" y="3532666"/>
+            <a:ext cx="5576370" cy="2716693"/>
+          </a:xfrm>
+          <a:prstGeom prst="rect">
+            <a:avLst/>
+          </a:prstGeom>
+          <a:noFill/>
+          <a:extLst>
+            <a:ext uri="{909E8E84-426E-40DD-AFC4-6F175D3DCCD1}">
+              <a14:hiddenFill xmlns:a14="http://schemas.microsoft.com/office/drawing/2010/main">
+                <a:solidFill>
+                  <a:srgbClr val="FFFFFF"/>
+                </a:solidFill>
+              </a14:hiddenFill>
+            </a:ext>
+          </a:extLst>
+        </p:spPr>
+      </p:pic>
     </p:spTree>
     <p:extLst>
       <p:ext uri="{BB962C8B-B14F-4D97-AF65-F5344CB8AC3E}">
@@ -6253,162 +6218,6 @@
   <p:cSld>
     <p:spTree>
       <p:nvGrpSpPr>
-        <p:cNvPr id="1" name=""/>
-        <p:cNvGrpSpPr/>
-        <p:nvPr/>
-      </p:nvGrpSpPr>
-      <p:grpSpPr>
-        <a:xfrm>
-          <a:off x="0" y="0"/>
-          <a:ext cx="0" cy="0"/>
-          <a:chOff x="0" y="0"/>
-          <a:chExt cx="0" cy="0"/>
-        </a:xfrm>
-      </p:grpSpPr>
-      <p:sp>
-        <p:nvSpPr>
-          <p:cNvPr id="2" name="Title 1">
-            <a:extLst>
-              <a:ext uri="{FF2B5EF4-FFF2-40B4-BE49-F238E27FC236}">
-                <a16:creationId xmlns:a16="http://schemas.microsoft.com/office/drawing/2014/main" id="{4A666753-7C5E-903D-0036-F77990953B2E}"/>
-              </a:ext>
-            </a:extLst>
-          </p:cNvPr>
-          <p:cNvSpPr>
-            <a:spLocks noGrp="1"/>
-          </p:cNvSpPr>
-          <p:nvPr>
-            <p:ph type="title"/>
-          </p:nvPr>
-        </p:nvSpPr>
-        <p:spPr/>
-        <p:txBody>
-          <a:bodyPr/>
-          <a:lstStyle/>
-          <a:p>
-            <a:r>
-              <a:rPr lang="en-US" dirty="0"/>
-              <a:t>Spectrum Bias</a:t>
-            </a:r>
-          </a:p>
-        </p:txBody>
-      </p:sp>
-      <p:sp>
-        <p:nvSpPr>
-          <p:cNvPr id="3" name="Content Placeholder 2">
-            <a:extLst>
-              <a:ext uri="{FF2B5EF4-FFF2-40B4-BE49-F238E27FC236}">
-                <a16:creationId xmlns:a16="http://schemas.microsoft.com/office/drawing/2014/main" id="{EAE2DE28-4277-B65E-C71D-D2CF27265285}"/>
-              </a:ext>
-            </a:extLst>
-          </p:cNvPr>
-          <p:cNvSpPr>
-            <a:spLocks noGrp="1"/>
-          </p:cNvSpPr>
-          <p:nvPr>
-            <p:ph idx="1"/>
-          </p:nvPr>
-        </p:nvSpPr>
-        <p:spPr/>
-        <p:txBody>
-          <a:bodyPr>
-            <a:normAutofit fontScale="55000" lnSpcReduction="20000"/>
-          </a:bodyPr>
-          <a:lstStyle/>
-          <a:p>
-            <a:r>
-              <a:rPr lang="en-US" dirty="0"/>
-              <a:t>13) Spectrum bias &amp; transportability (concepts)</a:t>
-            </a:r>
-          </a:p>
-          <a:p>
-            <a:r>
-              <a:rPr lang="en-US" dirty="0"/>
-              <a:t>	•	Spectrum effect: LR depends on case mix, prevalence, thresholds, and setting; transport is non‑trivial.</a:t>
-            </a:r>
-          </a:p>
-          <a:p>
-            <a:r>
-              <a:rPr lang="en-US" dirty="0"/>
-              <a:t>	•	Reported LRs often hide contextual constraints; applying them naïvely can </a:t>
-            </a:r>
-            <a:r>
-              <a:rPr lang="en-US" dirty="0" err="1"/>
-              <a:t>miscalibrate</a:t>
-            </a:r>
-            <a:r>
-              <a:rPr lang="en-US" dirty="0"/>
-              <a:t> posteriors.</a:t>
-            </a:r>
-          </a:p>
-          <a:p>
-            <a:r>
-              <a:rPr lang="en-US" dirty="0"/>
-              <a:t>	•	Implication: both empiric and model‑estimated LRs require explicit context to be clinically safe.  ￼</a:t>
-            </a:r>
-          </a:p>
-          <a:p>
-            <a:r>
-              <a:rPr lang="en-US" dirty="0"/>
-              <a:t>Visual: small schematic: “Study cohort → LR” failing to port to “ED cohort”.</a:t>
-            </a:r>
-          </a:p>
-          <a:p>
-            <a:endParaRPr lang="en-US" dirty="0"/>
-          </a:p>
-          <a:p>
-            <a:r>
-              <a:rPr lang="en-US" dirty="0"/>
-              <a:t>⸻</a:t>
-            </a:r>
-          </a:p>
-          <a:p>
-            <a:endParaRPr lang="en-US" dirty="0"/>
-          </a:p>
-          <a:p>
-            <a:r>
-              <a:rPr lang="en-US" dirty="0"/>
-              <a:t>14) Spectrum bias &amp; transportability (implications for this work)</a:t>
-            </a:r>
-          </a:p>
-          <a:p>
-            <a:r>
-              <a:rPr lang="en-US" dirty="0"/>
-              <a:t>	•	Our reference standard lacks per‑study context and CIs; models were not given those contexts either.</a:t>
-            </a:r>
-          </a:p>
-          <a:p>
-            <a:r>
-              <a:rPr lang="en-US" dirty="0"/>
-              <a:t>	•	Best use: auditable starting weights plus clinician or system‑level context adjustment.</a:t>
-            </a:r>
-          </a:p>
-          <a:p>
-            <a:r>
-              <a:rPr lang="en-US" dirty="0"/>
-              <a:t>	•	Path forward: condition–setting–population prompts; retrieval of context; calibration on local data; explicit uncertainty display. </a:t>
-            </a:r>
-          </a:p>
-        </p:txBody>
-      </p:sp>
-    </p:spTree>
-    <p:extLst>
-      <p:ext uri="{BB962C8B-B14F-4D97-AF65-F5344CB8AC3E}">
-        <p14:creationId xmlns:p14="http://schemas.microsoft.com/office/powerpoint/2010/main" val="2723381266"/>
-      </p:ext>
-    </p:extLst>
-  </p:cSld>
-  <p:clrMapOvr>
-    <a:masterClrMapping/>
-  </p:clrMapOvr>
-</p:sld>
-</file>
-
-<file path=ppt/slides/slide6.xml><?xml version="1.0" encoding="utf-8"?>
-<p:sld xmlns:a="http://schemas.openxmlformats.org/drawingml/2006/main" xmlns:r="http://schemas.openxmlformats.org/officeDocument/2006/relationships" xmlns:p="http://schemas.openxmlformats.org/presentationml/2006/main">
-  <p:cSld>
-    <p:spTree>
-      <p:nvGrpSpPr>
         <p:cNvPr id="1" name="">
           <a:extLst>
             <a:ext uri="{FF2B5EF4-FFF2-40B4-BE49-F238E27FC236}">
@@ -6514,18 +6323,12 @@
 </p:sld>
 </file>
 
-<file path=ppt/slides/slide7.xml><?xml version="1.0" encoding="utf-8"?>
+<file path=ppt/slides/slide6.xml><?xml version="1.0" encoding="utf-8"?>
 <p:sld xmlns:a="http://schemas.openxmlformats.org/drawingml/2006/main" xmlns:r="http://schemas.openxmlformats.org/officeDocument/2006/relationships" xmlns:p="http://schemas.openxmlformats.org/presentationml/2006/main">
   <p:cSld>
     <p:spTree>
       <p:nvGrpSpPr>
-        <p:cNvPr id="1" name="">
-          <a:extLst>
-            <a:ext uri="{FF2B5EF4-FFF2-40B4-BE49-F238E27FC236}">
-              <a16:creationId xmlns:a16="http://schemas.microsoft.com/office/drawing/2014/main" id="{9DC2A5EF-EBA8-B13E-2B65-23A5CE12A821}"/>
-            </a:ext>
-          </a:extLst>
-        </p:cNvPr>
+        <p:cNvPr id="1" name=""/>
         <p:cNvGrpSpPr/>
         <p:nvPr/>
       </p:nvGrpSpPr>
@@ -6542,7 +6345,7 @@
           <p:cNvPr id="2" name="Title 1">
             <a:extLst>
               <a:ext uri="{FF2B5EF4-FFF2-40B4-BE49-F238E27FC236}">
-                <a16:creationId xmlns:a16="http://schemas.microsoft.com/office/drawing/2014/main" id="{EACFB537-CA59-668B-44BA-B02A288D0942}"/>
+                <a16:creationId xmlns:a16="http://schemas.microsoft.com/office/drawing/2014/main" id="{4A666753-7C5E-903D-0036-F77990953B2E}"/>
               </a:ext>
             </a:extLst>
           </p:cNvPr>
@@ -6558,7 +6361,10 @@
           <a:bodyPr/>
           <a:lstStyle/>
           <a:p>
-            <a:endParaRPr lang="en-US" dirty="0"/>
+            <a:r>
+              <a:rPr lang="en-US" dirty="0"/>
+              <a:t>Why LRs Are Scarce</a:t>
+            </a:r>
           </a:p>
         </p:txBody>
       </p:sp>
@@ -6567,7 +6373,7 @@
           <p:cNvPr id="3" name="Content Placeholder 2">
             <a:extLst>
               <a:ext uri="{FF2B5EF4-FFF2-40B4-BE49-F238E27FC236}">
-                <a16:creationId xmlns:a16="http://schemas.microsoft.com/office/drawing/2014/main" id="{4E056C8C-2AD9-3B6A-C094-9F46ED18E9D2}"/>
+                <a16:creationId xmlns:a16="http://schemas.microsoft.com/office/drawing/2014/main" id="{EAE2DE28-4277-B65E-C71D-D2CF27265285}"/>
               </a:ext>
             </a:extLst>
           </p:cNvPr>
@@ -6580,30 +6386,35 @@
         </p:nvSpPr>
         <p:spPr/>
         <p:txBody>
-          <a:bodyPr/>
+          <a:bodyPr>
+            <a:normAutofit/>
+          </a:bodyPr>
           <a:lstStyle/>
           <a:p>
+            <a:pPr marL="0" indent="0">
+              <a:buNone/>
+            </a:pPr>
             <a:r>
               <a:rPr lang="en-US" dirty="0"/>
-              <a:t>	•	Question: Are models parroting or predicting?</a:t>
+              <a:t>Condition–finding–context space is huge.</a:t>
             </a:r>
           </a:p>
           <a:p>
             <a:r>
               <a:rPr lang="en-US" dirty="0"/>
-              <a:t>	•	Use LLM‑generated LRs as a priori hypotheses for future diagnostic studies.</a:t>
+              <a:t>Accuracy studies are costly and slow.</a:t>
             </a:r>
           </a:p>
           <a:p>
             <a:r>
               <a:rPr lang="en-US" dirty="0"/>
-              <a:t>	•	Outcome: Benchmarks for model accuracy and a path to real scientific prediction.</a:t>
+              <a:t>LRs drift with spectrum and setting.</a:t>
             </a:r>
           </a:p>
           <a:p>
             <a:r>
               <a:rPr lang="en-US" dirty="0"/>
-              <a:t>	•	Preview: Prospective, leakage‑controlled evaluations later in the deck.</a:t>
+              <a:t>Bottom line: we need credible estimates.</a:t>
             </a:r>
           </a:p>
         </p:txBody>
@@ -6611,7 +6422,7 @@
     </p:spTree>
     <p:extLst>
       <p:ext uri="{BB962C8B-B14F-4D97-AF65-F5344CB8AC3E}">
-        <p14:creationId xmlns:p14="http://schemas.microsoft.com/office/powerpoint/2010/main" val="2118086365"/>
+        <p14:creationId xmlns:p14="http://schemas.microsoft.com/office/powerpoint/2010/main" val="2723381266"/>
       </p:ext>
     </p:extLst>
   </p:cSld>
@@ -6621,7 +6432,7 @@
 </p:sld>
 </file>
 
-<file path=ppt/slides/slide8.xml><?xml version="1.0" encoding="utf-8"?>
+<file path=ppt/slides/slide7.xml><?xml version="1.0" encoding="utf-8"?>
 <p:sld xmlns:a="http://schemas.openxmlformats.org/drawingml/2006/main" xmlns:r="http://schemas.openxmlformats.org/officeDocument/2006/relationships" xmlns:p="http://schemas.openxmlformats.org/presentationml/2006/main">
   <p:cSld>
     <p:spTree>
@@ -8704,10 +8515,158 @@
           </a:prstGeom>
         </p:spPr>
       </p:pic>
+      <p:pic>
+        <p:nvPicPr>
+          <p:cNvPr id="2" name="Picture 1">
+            <a:extLst>
+              <a:ext uri="{FF2B5EF4-FFF2-40B4-BE49-F238E27FC236}">
+                <a16:creationId xmlns:a16="http://schemas.microsoft.com/office/drawing/2014/main" id="{5FFB3139-30C0-F83A-6B85-BC65AF4EB33F}"/>
+              </a:ext>
+            </a:extLst>
+          </p:cNvPr>
+          <p:cNvPicPr>
+            <a:picLocks noChangeAspect="1"/>
+          </p:cNvPicPr>
+          <p:nvPr/>
+        </p:nvPicPr>
+        <p:blipFill>
+          <a:blip r:embed="rId3"/>
+          <a:stretch>
+            <a:fillRect/>
+          </a:stretch>
+        </p:blipFill>
+        <p:spPr>
+          <a:xfrm>
+            <a:off x="84992" y="2793895"/>
+            <a:ext cx="6821133" cy="3922880"/>
+          </a:xfrm>
+          <a:prstGeom prst="rect">
+            <a:avLst/>
+          </a:prstGeom>
+        </p:spPr>
+      </p:pic>
     </p:spTree>
     <p:extLst>
       <p:ext uri="{BB962C8B-B14F-4D97-AF65-F5344CB8AC3E}">
         <p14:creationId xmlns:p14="http://schemas.microsoft.com/office/powerpoint/2010/main" val="3626269279"/>
+      </p:ext>
+    </p:extLst>
+  </p:cSld>
+  <p:clrMapOvr>
+    <a:masterClrMapping/>
+  </p:clrMapOvr>
+</p:sld>
+</file>
+
+<file path=ppt/slides/slide8.xml><?xml version="1.0" encoding="utf-8"?>
+<p:sld xmlns:a="http://schemas.openxmlformats.org/drawingml/2006/main" xmlns:r="http://schemas.openxmlformats.org/officeDocument/2006/relationships" xmlns:p="http://schemas.openxmlformats.org/presentationml/2006/main">
+  <p:cSld>
+    <p:spTree>
+      <p:nvGrpSpPr>
+        <p:cNvPr id="1" name=""/>
+        <p:cNvGrpSpPr/>
+        <p:nvPr/>
+      </p:nvGrpSpPr>
+      <p:grpSpPr>
+        <a:xfrm>
+          <a:off x="0" y="0"/>
+          <a:ext cx="0" cy="0"/>
+          <a:chOff x="0" y="0"/>
+          <a:chExt cx="0" cy="0"/>
+        </a:xfrm>
+      </p:grpSpPr>
+      <p:sp>
+        <p:nvSpPr>
+          <p:cNvPr id="2" name="Title 1">
+            <a:extLst>
+              <a:ext uri="{FF2B5EF4-FFF2-40B4-BE49-F238E27FC236}">
+                <a16:creationId xmlns:a16="http://schemas.microsoft.com/office/drawing/2014/main" id="{642D9013-6986-A13B-6545-0B2992DE271B}"/>
+              </a:ext>
+            </a:extLst>
+          </p:cNvPr>
+          <p:cNvSpPr>
+            <a:spLocks noGrp="1"/>
+          </p:cNvSpPr>
+          <p:nvPr>
+            <p:ph type="title"/>
+          </p:nvPr>
+        </p:nvSpPr>
+        <p:spPr/>
+        <p:txBody>
+          <a:bodyPr/>
+          <a:lstStyle/>
+          <a:p>
+            <a:r>
+              <a:rPr lang="en-US" dirty="0"/>
+              <a:t>Study design &amp; models</a:t>
+            </a:r>
+          </a:p>
+        </p:txBody>
+      </p:sp>
+      <p:sp>
+        <p:nvSpPr>
+          <p:cNvPr id="3" name="Content Placeholder 2">
+            <a:extLst>
+              <a:ext uri="{FF2B5EF4-FFF2-40B4-BE49-F238E27FC236}">
+                <a16:creationId xmlns:a16="http://schemas.microsoft.com/office/drawing/2014/main" id="{D712772B-A7E1-2F8C-6152-A3B47F9FE173}"/>
+              </a:ext>
+            </a:extLst>
+          </p:cNvPr>
+          <p:cNvSpPr>
+            <a:spLocks noGrp="1"/>
+          </p:cNvSpPr>
+          <p:nvPr>
+            <p:ph idx="1"/>
+          </p:nvPr>
+        </p:nvSpPr>
+        <p:spPr/>
+        <p:txBody>
+          <a:bodyPr/>
+          <a:lstStyle/>
+          <a:p>
+            <a:r>
+              <a:rPr lang="en-US" dirty="0"/>
+              <a:t>Task: Compare LLM‑estimated LRs to </a:t>
+            </a:r>
+            <a:r>
+              <a:rPr lang="en-US" dirty="0" err="1"/>
+              <a:t>TheNNT</a:t>
+            </a:r>
+            <a:r>
+              <a:rPr lang="en-US" dirty="0"/>
+              <a:t> values for each finding–condition pair.</a:t>
+            </a:r>
+          </a:p>
+          <a:p>
+            <a:r>
+              <a:rPr lang="en-US" dirty="0"/>
+              <a:t>Models: GPT‑4o, o3, GPT‑5 (increasing recency/ability).</a:t>
+            </a:r>
+          </a:p>
+          <a:p>
+            <a:r>
+              <a:rPr lang="en-US" dirty="0"/>
+              <a:t>Date of LLM queries: Aug 25, 2025.</a:t>
+            </a:r>
+          </a:p>
+          <a:p>
+            <a:r>
+              <a:rPr lang="en-US" dirty="0"/>
+              <a:t>No web access; no fine‑tuning; few‑shot only.</a:t>
+            </a:r>
+          </a:p>
+          <a:p>
+            <a:r>
+              <a:rPr lang="en-US" dirty="0"/>
+              <a:t>Agreement assessed with Bland–Altman on log‑LR (ratio limits reported)</a:t>
+            </a:r>
+          </a:p>
+        </p:txBody>
+      </p:sp>
+    </p:spTree>
+    <p:extLst>
+      <p:ext uri="{BB962C8B-B14F-4D97-AF65-F5344CB8AC3E}">
+        <p14:creationId xmlns:p14="http://schemas.microsoft.com/office/powerpoint/2010/main" val="3456736094"/>
       </p:ext>
     </p:extLst>
   </p:cSld>
@@ -8739,7 +8698,7 @@
           <p:cNvPr id="2" name="Title 1">
             <a:extLst>
               <a:ext uri="{FF2B5EF4-FFF2-40B4-BE49-F238E27FC236}">
-                <a16:creationId xmlns:a16="http://schemas.microsoft.com/office/drawing/2014/main" id="{642D9013-6986-A13B-6545-0B2992DE271B}"/>
+                <a16:creationId xmlns:a16="http://schemas.microsoft.com/office/drawing/2014/main" id="{43C13E1F-2C63-A4A5-5F5F-F8CEA293ABCE}"/>
               </a:ext>
             </a:extLst>
           </p:cNvPr>
@@ -8757,7 +8716,7 @@
           <a:p>
             <a:r>
               <a:rPr lang="en-US" dirty="0"/>
-              <a:t>Study design &amp; models</a:t>
+              <a:t>Prompt Strategy: </a:t>
             </a:r>
           </a:p>
         </p:txBody>
@@ -8767,7 +8726,7 @@
           <p:cNvPr id="3" name="Content Placeholder 2">
             <a:extLst>
               <a:ext uri="{FF2B5EF4-FFF2-40B4-BE49-F238E27FC236}">
-                <a16:creationId xmlns:a16="http://schemas.microsoft.com/office/drawing/2014/main" id="{D712772B-A7E1-2F8C-6152-A3B47F9FE173}"/>
+                <a16:creationId xmlns:a16="http://schemas.microsoft.com/office/drawing/2014/main" id="{993C719E-48C9-7C90-B014-8E87BF48B396}"/>
               </a:ext>
             </a:extLst>
           </p:cNvPr>
@@ -8780,44 +8739,80 @@
         </p:nvSpPr>
         <p:spPr/>
         <p:txBody>
-          <a:bodyPr/>
+          <a:bodyPr>
+            <a:normAutofit fontScale="92500" lnSpcReduction="10000"/>
+          </a:bodyPr>
           <a:lstStyle/>
           <a:p>
+            <a:pPr marL="0" indent="0">
+              <a:buNone/>
+            </a:pPr>
             <a:r>
               <a:rPr lang="en-US" dirty="0"/>
-              <a:t>Task: Compare LLM‑estimated LRs to </a:t>
-            </a:r>
-            <a:r>
-              <a:rPr lang="en-US" dirty="0" err="1"/>
-              <a:t>TheNNT</a:t>
-            </a:r>
+              <a:t>System role: “Bayesian diagnostic assistant”; return only JSON {"value": float&gt;0}.</a:t>
+            </a:r>
+          </a:p>
+          <a:p>
+            <a:pPr marL="0" indent="0">
+              <a:buNone/>
+            </a:pPr>
             <a:r>
               <a:rPr lang="en-US" dirty="0"/>
-              <a:t> values for each finding–condition pair.</a:t>
-            </a:r>
-          </a:p>
-          <a:p>
+              <a:t>Definition shown: LR = P(finding | diagnosis) / P(finding | not‑diagnosis).</a:t>
+            </a:r>
+          </a:p>
+          <a:p>
+            <a:pPr marL="0" indent="0">
+              <a:buNone/>
+            </a:pPr>
             <a:r>
               <a:rPr lang="en-US" dirty="0"/>
-              <a:t>Models: GPT‑4o, o3, GPT‑5 (increasing recency/ability).</a:t>
-            </a:r>
-          </a:p>
-          <a:p>
+              <a:t>Few‑shot: 8 examples for non‑reasoning model; 2 for reasoning models; examples are clinician‑estimated, not scraped.</a:t>
+            </a:r>
+          </a:p>
+          <a:p>
+            <a:pPr marL="0" indent="0">
+              <a:buNone/>
+            </a:pPr>
             <a:r>
               <a:rPr lang="en-US" dirty="0"/>
-              <a:t>Date of LLM queries: Aug 25, 2025.</a:t>
-            </a:r>
-          </a:p>
-          <a:p>
+              <a:t>Inference: </a:t>
+            </a:r>
+          </a:p>
+          <a:p>
+            <a:pPr marL="0" indent="0">
+              <a:buNone/>
+            </a:pPr>
             <a:r>
               <a:rPr lang="en-US" dirty="0"/>
-              <a:t>No web access; no fine‑tuning; few‑shot only.</a:t>
-            </a:r>
-          </a:p>
-          <a:p>
+              <a:t>	GPT‑4o temperature 0.2; </a:t>
+            </a:r>
+          </a:p>
+          <a:p>
+            <a:pPr marL="0" indent="0">
+              <a:buNone/>
+            </a:pPr>
             <a:r>
               <a:rPr lang="en-US" dirty="0"/>
-              <a:t>Agreement assessed with Bland–Altman on log‑LR (ratio limits reported)</a:t>
+              <a:t>	o3/GPT‑5 reasoning effort “medium”; </a:t>
+            </a:r>
+          </a:p>
+          <a:p>
+            <a:pPr marL="0" indent="0">
+              <a:buNone/>
+            </a:pPr>
+            <a:r>
+              <a:rPr lang="en-US" dirty="0"/>
+              <a:t>	verbosity minimized; </a:t>
+            </a:r>
+          </a:p>
+          <a:p>
+            <a:pPr marL="0" indent="0">
+              <a:buNone/>
+            </a:pPr>
+            <a:r>
+              <a:rPr lang="en-US" dirty="0"/>
+              <a:t>	structured outputs enforced with schema. </a:t>
             </a:r>
           </a:p>
         </p:txBody>
@@ -8825,7 +8820,7 @@
     </p:spTree>
     <p:extLst>
       <p:ext uri="{BB962C8B-B14F-4D97-AF65-F5344CB8AC3E}">
-        <p14:creationId xmlns:p14="http://schemas.microsoft.com/office/powerpoint/2010/main" val="3456736094"/>
+        <p14:creationId xmlns:p14="http://schemas.microsoft.com/office/powerpoint/2010/main" val="443676690"/>
       </p:ext>
     </p:extLst>
   </p:cSld>

</xml_diff>